<commit_message>
mockups added 2 screens
</commit_message>
<xml_diff>
--- a/Inception_revision_datastructures.pptx
+++ b/Inception_revision_datastructures.pptx
@@ -5,11 +5,12 @@
     <p:sldMasterId id="2147483648" r:id="rId1"/>
   </p:sldMasterIdLst>
   <p:notesMasterIdLst>
-    <p:notesMasterId r:id="rId4"/>
+    <p:notesMasterId r:id="rId5"/>
   </p:notesMasterIdLst>
   <p:sldIdLst>
     <p:sldId id="266" r:id="rId2"/>
     <p:sldId id="267" r:id="rId3"/>
+    <p:sldId id="268" r:id="rId4"/>
   </p:sldIdLst>
   <p:sldSz cx="12192000" cy="6858000"/>
   <p:notesSz cx="6858000" cy="9144000"/>
@@ -6841,6 +6842,96 @@
     <p:extLst>
       <p:ext uri="{BB962C8B-B14F-4D97-AF65-F5344CB8AC3E}">
         <p14:creationId xmlns:p14="http://schemas.microsoft.com/office/powerpoint/2010/main" val="3700536698"/>
+      </p:ext>
+    </p:extLst>
+  </p:cSld>
+  <p:clrMapOvr>
+    <a:masterClrMapping/>
+  </p:clrMapOvr>
+  <p:timing>
+    <p:tnLst>
+      <p:par>
+        <p:cTn id="1" dur="indefinite" restart="never" nodeType="tmRoot"/>
+      </p:par>
+    </p:tnLst>
+  </p:timing>
+</p:sld>
+</file>
+
+<file path=ppt/slides/slide3.xml><?xml version="1.0" encoding="utf-8"?>
+<p:sld xmlns:a="http://schemas.openxmlformats.org/drawingml/2006/main" xmlns:r="http://schemas.openxmlformats.org/officeDocument/2006/relationships" xmlns:p="http://schemas.openxmlformats.org/presentationml/2006/main">
+  <p:cSld>
+    <p:spTree>
+      <p:nvGrpSpPr>
+        <p:cNvPr id="1" name=""/>
+        <p:cNvGrpSpPr/>
+        <p:nvPr/>
+      </p:nvGrpSpPr>
+      <p:grpSpPr>
+        <a:xfrm>
+          <a:off x="0" y="0"/>
+          <a:ext cx="0" cy="0"/>
+          <a:chOff x="0" y="0"/>
+          <a:chExt cx="0" cy="0"/>
+        </a:xfrm>
+      </p:grpSpPr>
+      <p:sp>
+        <p:nvSpPr>
+          <p:cNvPr id="2" name="Slide Number Placeholder 1"/>
+          <p:cNvSpPr>
+            <a:spLocks noGrp="1"/>
+          </p:cNvSpPr>
+          <p:nvPr>
+            <p:ph type="sldNum" sz="quarter" idx="12"/>
+          </p:nvPr>
+        </p:nvSpPr>
+        <p:spPr/>
+        <p:txBody>
+          <a:bodyPr/>
+          <a:lstStyle/>
+          <a:p>
+            <a:fld id="{D57F1E4F-1CFF-5643-939E-02111984F565}" type="slidenum">
+              <a:rPr lang="en-US" smtClean="0"/>
+              <a:t>3</a:t>
+            </a:fld>
+            <a:endParaRPr lang="en-US" dirty="0"/>
+          </a:p>
+        </p:txBody>
+      </p:sp>
+      <p:pic>
+        <p:nvPicPr>
+          <p:cNvPr id="6" name="Picture 5"/>
+          <p:cNvPicPr>
+            <a:picLocks noChangeAspect="1"/>
+          </p:cNvPicPr>
+          <p:nvPr/>
+        </p:nvPicPr>
+        <p:blipFill>
+          <a:blip r:embed="rId2">
+            <a:extLst>
+              <a:ext uri="{28A0092B-C50C-407E-A947-70E740481C1C}">
+                <a14:useLocalDpi xmlns:a14="http://schemas.microsoft.com/office/drawing/2010/main" val="0"/>
+              </a:ext>
+            </a:extLst>
+          </a:blip>
+          <a:stretch>
+            <a:fillRect/>
+          </a:stretch>
+        </p:blipFill>
+        <p:spPr>
+          <a:xfrm>
+            <a:off x="4106184" y="0"/>
+            <a:ext cx="3807327" cy="6857999"/>
+          </a:xfrm>
+          <a:prstGeom prst="rect">
+            <a:avLst/>
+          </a:prstGeom>
+        </p:spPr>
+      </p:pic>
+    </p:spTree>
+    <p:extLst>
+      <p:ext uri="{BB962C8B-B14F-4D97-AF65-F5344CB8AC3E}">
+        <p14:creationId xmlns:p14="http://schemas.microsoft.com/office/powerpoint/2010/main" val="1229899464"/>
       </p:ext>
     </p:extLst>
   </p:cSld>

</xml_diff>